<commit_message>
New version of the presentation
</commit_message>
<xml_diff>
--- a/Presentation.pptx
+++ b/Presentation.pptx
@@ -6,9 +6,12 @@
   </p:sldMasterIdLst>
   <p:sldIdLst>
     <p:sldId id="256" r:id="rId2"/>
-    <p:sldId id="259" r:id="rId3"/>
-    <p:sldId id="257" r:id="rId4"/>
-    <p:sldId id="258" r:id="rId5"/>
+    <p:sldId id="260" r:id="rId3"/>
+    <p:sldId id="261" r:id="rId4"/>
+    <p:sldId id="262" r:id="rId5"/>
+    <p:sldId id="259" r:id="rId6"/>
+    <p:sldId id="257" r:id="rId7"/>
+    <p:sldId id="258" r:id="rId8"/>
   </p:sldIdLst>
   <p:sldSz cx="9144000" cy="6858000" type="screen4x3"/>
   <p:notesSz cx="6858000" cy="9144000"/>
@@ -3165,6 +3168,292 @@
           <a:p>
             <a:r>
               <a:rPr lang="en-US" dirty="0" smtClean="0"/>
+              <a:t>13:00</a:t>
+            </a:r>
+            <a:endParaRPr lang="ru-RU" dirty="0"/>
+          </a:p>
+        </p:txBody>
+      </p:sp>
+      <p:sp>
+        <p:nvSpPr>
+          <p:cNvPr id="3" name="Content Placeholder 2"/>
+          <p:cNvSpPr>
+            <a:spLocks noGrp="1"/>
+          </p:cNvSpPr>
+          <p:nvPr>
+            <p:ph idx="1"/>
+          </p:nvPr>
+        </p:nvSpPr>
+        <p:spPr/>
+        <p:txBody>
+          <a:bodyPr/>
+          <a:lstStyle/>
+          <a:p>
+            <a:endParaRPr lang="ru-RU"/>
+          </a:p>
+        </p:txBody>
+      </p:sp>
+    </p:spTree>
+  </p:cSld>
+  <p:clrMapOvr>
+    <a:masterClrMapping/>
+  </p:clrMapOvr>
+</p:sld>
+</file>
+
+<file path=ppt/slides/slide3.xml><?xml version="1.0" encoding="utf-8"?>
+<p:sld xmlns:a="http://schemas.openxmlformats.org/drawingml/2006/main" xmlns:r="http://schemas.openxmlformats.org/officeDocument/2006/relationships" xmlns:p="http://schemas.openxmlformats.org/presentationml/2006/main">
+  <p:cSld>
+    <p:spTree>
+      <p:nvGrpSpPr>
+        <p:cNvPr id="1" name=""/>
+        <p:cNvGrpSpPr/>
+        <p:nvPr/>
+      </p:nvGrpSpPr>
+      <p:grpSpPr>
+        <a:xfrm>
+          <a:off x="0" y="0"/>
+          <a:ext cx="0" cy="0"/>
+          <a:chOff x="0" y="0"/>
+          <a:chExt cx="0" cy="0"/>
+        </a:xfrm>
+      </p:grpSpPr>
+      <p:sp>
+        <p:nvSpPr>
+          <p:cNvPr id="2" name="Title 1"/>
+          <p:cNvSpPr>
+            <a:spLocks noGrp="1"/>
+          </p:cNvSpPr>
+          <p:nvPr>
+            <p:ph type="title"/>
+          </p:nvPr>
+        </p:nvSpPr>
+        <p:spPr/>
+        <p:txBody>
+          <a:bodyPr/>
+          <a:lstStyle/>
+          <a:p>
+            <a:r>
+              <a:rPr lang="en-US" dirty="0" smtClean="0"/>
+              <a:t>22:00</a:t>
+            </a:r>
+            <a:endParaRPr lang="ru-RU" dirty="0"/>
+          </a:p>
+        </p:txBody>
+      </p:sp>
+      <p:sp>
+        <p:nvSpPr>
+          <p:cNvPr id="3" name="Content Placeholder 2"/>
+          <p:cNvSpPr>
+            <a:spLocks noGrp="1"/>
+          </p:cNvSpPr>
+          <p:nvPr>
+            <p:ph idx="1"/>
+          </p:nvPr>
+        </p:nvSpPr>
+        <p:spPr/>
+        <p:txBody>
+          <a:bodyPr/>
+          <a:lstStyle/>
+          <a:p>
+            <a:endParaRPr lang="ru-RU" dirty="0"/>
+          </a:p>
+        </p:txBody>
+      </p:sp>
+    </p:spTree>
+  </p:cSld>
+  <p:clrMapOvr>
+    <a:masterClrMapping/>
+  </p:clrMapOvr>
+</p:sld>
+</file>
+
+<file path=ppt/slides/slide4.xml><?xml version="1.0" encoding="utf-8"?>
+<p:sld xmlns:a="http://schemas.openxmlformats.org/drawingml/2006/main" xmlns:r="http://schemas.openxmlformats.org/officeDocument/2006/relationships" xmlns:p="http://schemas.openxmlformats.org/presentationml/2006/main">
+  <p:cSld>
+    <p:spTree>
+      <p:nvGrpSpPr>
+        <p:cNvPr id="1" name=""/>
+        <p:cNvGrpSpPr/>
+        <p:nvPr/>
+      </p:nvGrpSpPr>
+      <p:grpSpPr>
+        <a:xfrm>
+          <a:off x="0" y="0"/>
+          <a:ext cx="0" cy="0"/>
+          <a:chOff x="0" y="0"/>
+          <a:chExt cx="0" cy="0"/>
+        </a:xfrm>
+      </p:grpSpPr>
+      <p:sp>
+        <p:nvSpPr>
+          <p:cNvPr id="2" name="Title 1"/>
+          <p:cNvSpPr>
+            <a:spLocks noGrp="1"/>
+          </p:cNvSpPr>
+          <p:nvPr>
+            <p:ph type="title"/>
+          </p:nvPr>
+        </p:nvSpPr>
+        <p:spPr/>
+        <p:txBody>
+          <a:bodyPr/>
+          <a:lstStyle/>
+          <a:p>
+            <a:r>
+              <a:rPr lang="en-US" dirty="0" smtClean="0"/>
+              <a:t>Thank You!</a:t>
+            </a:r>
+            <a:endParaRPr lang="ru-RU" dirty="0"/>
+          </a:p>
+        </p:txBody>
+      </p:sp>
+      <p:sp>
+        <p:nvSpPr>
+          <p:cNvPr id="3" name="Content Placeholder 2"/>
+          <p:cNvSpPr>
+            <a:spLocks noGrp="1"/>
+          </p:cNvSpPr>
+          <p:nvPr>
+            <p:ph idx="1"/>
+          </p:nvPr>
+        </p:nvSpPr>
+        <p:spPr/>
+        <p:txBody>
+          <a:bodyPr/>
+          <a:lstStyle/>
+          <a:p>
+            <a:r>
+              <a:rPr lang="en-US" dirty="0" smtClean="0">
+                <a:hlinkClick r:id="rId2"/>
+              </a:rPr>
+              <a:t>https://</a:t>
+            </a:r>
+            <a:r>
+              <a:rPr lang="en-US" dirty="0" smtClean="0">
+                <a:hlinkClick r:id="rId2"/>
+              </a:rPr>
+              <a:t>github.com/Isantipov/HotScroll</a:t>
+            </a:r>
+            <a:endParaRPr lang="en-US" dirty="0" smtClean="0"/>
+          </a:p>
+          <a:p>
+            <a:r>
+              <a:rPr lang="en-US" dirty="0" smtClean="0"/>
+              <a:t>Team</a:t>
+            </a:r>
+            <a:r>
+              <a:rPr lang="ru-RU" dirty="0" smtClean="0"/>
+              <a:t>: </a:t>
+            </a:r>
+            <a:r>
+              <a:rPr lang="en-US" dirty="0" smtClean="0"/>
+              <a:t> </a:t>
+            </a:r>
+            <a:endParaRPr lang="en-US" dirty="0" smtClean="0">
+              <a:hlinkClick r:id="rId3"/>
+            </a:endParaRPr>
+          </a:p>
+          <a:p>
+            <a:pPr lvl="1"/>
+            <a:r>
+              <a:rPr lang="en-US" dirty="0" smtClean="0">
+                <a:hlinkClick r:id="rId3"/>
+              </a:rPr>
+              <a:t>ivan.antsipau@gmail.com</a:t>
+            </a:r>
+            <a:endParaRPr lang="en-US" dirty="0" smtClean="0">
+              <a:hlinkClick r:id="rId3"/>
+            </a:endParaRPr>
+          </a:p>
+          <a:p>
+            <a:pPr lvl="1"/>
+            <a:r>
+              <a:rPr lang="en-US" dirty="0" smtClean="0">
+                <a:hlinkClick r:id="rId3"/>
+              </a:rPr>
+              <a:t>d.parf@live.com</a:t>
+            </a:r>
+          </a:p>
+          <a:p>
+            <a:pPr lvl="1"/>
+            <a:r>
+              <a:rPr lang="en-US" smtClean="0">
+                <a:hlinkClick r:id="rId3"/>
+              </a:rPr>
+              <a:t>e.leychenok@gmail.com</a:t>
+            </a:r>
+          </a:p>
+          <a:p>
+            <a:pPr lvl="1"/>
+            <a:endParaRPr lang="en-US" dirty="0" smtClean="0">
+              <a:hlinkClick r:id="rId3"/>
+            </a:endParaRPr>
+          </a:p>
+          <a:p>
+            <a:pPr lvl="1"/>
+            <a:r>
+              <a:rPr lang="en-US" dirty="0" smtClean="0">
+                <a:hlinkClick r:id="rId4"/>
+              </a:rPr>
+              <a:t>19graff91@gmail.com</a:t>
+            </a:r>
+            <a:r>
+              <a:rPr lang="en-US" dirty="0" smtClean="0"/>
+              <a:t>   </a:t>
+            </a:r>
+          </a:p>
+          <a:p>
+            <a:pPr lvl="1"/>
+            <a:endParaRPr lang="en-US" dirty="0" smtClean="0"/>
+          </a:p>
+          <a:p>
+            <a:endParaRPr lang="ru-RU" dirty="0"/>
+          </a:p>
+        </p:txBody>
+      </p:sp>
+    </p:spTree>
+  </p:cSld>
+  <p:clrMapOvr>
+    <a:masterClrMapping/>
+  </p:clrMapOvr>
+</p:sld>
+</file>
+
+<file path=ppt/slides/slide5.xml><?xml version="1.0" encoding="utf-8"?>
+<p:sld xmlns:a="http://schemas.openxmlformats.org/drawingml/2006/main" xmlns:r="http://schemas.openxmlformats.org/officeDocument/2006/relationships" xmlns:p="http://schemas.openxmlformats.org/presentationml/2006/main">
+  <p:cSld>
+    <p:spTree>
+      <p:nvGrpSpPr>
+        <p:cNvPr id="1" name=""/>
+        <p:cNvGrpSpPr/>
+        <p:nvPr/>
+      </p:nvGrpSpPr>
+      <p:grpSpPr>
+        <a:xfrm>
+          <a:off x="0" y="0"/>
+          <a:ext cx="0" cy="0"/>
+          <a:chOff x="0" y="0"/>
+          <a:chExt cx="0" cy="0"/>
+        </a:xfrm>
+      </p:grpSpPr>
+      <p:sp>
+        <p:nvSpPr>
+          <p:cNvPr id="2" name="Title 1"/>
+          <p:cNvSpPr>
+            <a:spLocks noGrp="1"/>
+          </p:cNvSpPr>
+          <p:nvPr>
+            <p:ph type="title"/>
+          </p:nvPr>
+        </p:nvSpPr>
+        <p:spPr/>
+        <p:txBody>
+          <a:bodyPr/>
+          <a:lstStyle/>
+          <a:p>
+            <a:r>
+              <a:rPr lang="en-US" dirty="0" smtClean="0"/>
               <a:t>First Round of Investment</a:t>
             </a:r>
             <a:endParaRPr lang="ru-RU" dirty="0"/>
@@ -3379,7 +3668,7 @@
 </p:sld>
 </file>
 
-<file path=ppt/slides/slide3.xml><?xml version="1.0" encoding="utf-8"?>
+<file path=ppt/slides/slide6.xml><?xml version="1.0" encoding="utf-8"?>
 <p:sld xmlns:a="http://schemas.openxmlformats.org/drawingml/2006/main" xmlns:r="http://schemas.openxmlformats.org/officeDocument/2006/relationships" xmlns:p="http://schemas.openxmlformats.org/presentationml/2006/main">
   <p:cSld>
     <p:spTree>
@@ -3493,7 +3782,7 @@
 </p:sld>
 </file>
 
-<file path=ppt/slides/slide4.xml><?xml version="1.0" encoding="utf-8"?>
+<file path=ppt/slides/slide7.xml><?xml version="1.0" encoding="utf-8"?>
 <p:sld xmlns:a="http://schemas.openxmlformats.org/drawingml/2006/main" xmlns:r="http://schemas.openxmlformats.org/officeDocument/2006/relationships" xmlns:p="http://schemas.openxmlformats.org/presentationml/2006/main">
   <p:cSld>
     <p:spTree>

</xml_diff>

<commit_message>
Add demo pic to th presentation
</commit_message>
<xml_diff>
--- a/Presentation.pptx
+++ b/Presentation.pptx
@@ -3256,15 +3256,53 @@
           <a:bodyPr/>
           <a:lstStyle/>
           <a:p>
+            <a:pPr algn="ctr"/>
+            <a:r>
+              <a:rPr lang="en-US" dirty="0" smtClean="0"/>
+              <a:t>Get ready!</a:t>
+            </a:r>
             <a:endParaRPr lang="ru-RU" dirty="0"/>
           </a:p>
         </p:txBody>
       </p:sp>
+      <p:pic>
+        <p:nvPicPr>
+          <p:cNvPr id="2050" name="Picture 2" descr="http://media.memories.nokia.com/media/33dd9e6a-7bfb-45fb-83b7-4ee4e3f39231.gif"/>
+          <p:cNvPicPr>
+            <a:picLocks noChangeAspect="1" noChangeArrowheads="1" noCrop="1"/>
+          </p:cNvPicPr>
+          <p:nvPr/>
+        </p:nvPicPr>
+        <p:blipFill>
+          <a:blip r:embed="rId2" cstate="print"/>
+          <a:srcRect/>
+          <a:stretch>
+            <a:fillRect/>
+          </a:stretch>
+        </p:blipFill>
+        <p:spPr bwMode="auto">
+          <a:xfrm>
+            <a:off x="899592" y="2204864"/>
+            <a:ext cx="7620000" cy="4267200"/>
+          </a:xfrm>
+          <a:prstGeom prst="rect">
+            <a:avLst/>
+          </a:prstGeom>
+          <a:noFill/>
+        </p:spPr>
+      </p:pic>
     </p:spTree>
   </p:cSld>
   <p:clrMapOvr>
     <a:masterClrMapping/>
   </p:clrMapOvr>
+  <p:timing>
+    <p:tnLst>
+      <p:par>
+        <p:cTn id="1" dur="indefinite" restart="never" nodeType="tmRoot"/>
+      </p:par>
+    </p:tnLst>
+  </p:timing>
 </p:sld>
 </file>
 
@@ -3378,7 +3416,7 @@
           <a:p>
             <a:pPr lvl="1"/>
             <a:r>
-              <a:rPr lang="en-US" smtClean="0">
+              <a:rPr lang="en-US" dirty="0" smtClean="0">
                 <a:hlinkClick r:id="rId3"/>
               </a:rPr>
               <a:t>e.leychenok@gmail.com</a:t>
@@ -3417,6 +3455,13 @@
   <p:clrMapOvr>
     <a:masterClrMapping/>
   </p:clrMapOvr>
+  <p:timing>
+    <p:tnLst>
+      <p:par>
+        <p:cTn id="1" dur="indefinite" restart="never" nodeType="tmRoot"/>
+      </p:par>
+    </p:tnLst>
+  </p:timing>
 </p:sld>
 </file>
 
@@ -3665,6 +3710,13 @@
   <p:clrMapOvr>
     <a:masterClrMapping/>
   </p:clrMapOvr>
+  <p:timing>
+    <p:tnLst>
+      <p:par>
+        <p:cTn id="1" dur="indefinite" restart="never" nodeType="tmRoot"/>
+      </p:par>
+    </p:tnLst>
+  </p:timing>
 </p:sld>
 </file>
 

</xml_diff>